<commit_message>
typo in lec 12 fixed
</commit_message>
<xml_diff>
--- a/Slides/Lecture 12.pptx
+++ b/Slides/Lecture 12.pptx
@@ -10284,8 +10284,8 @@
           </a:p>
         </p:txBody>
       </p:sp>
-      <mc:AlternateContent xmlns:mc="http://schemas.openxmlformats.org/markup-compatibility/2006">
-        <mc:Choice xmlns:a14="http://schemas.microsoft.com/office/drawing/2010/main" Requires="a14">
+      <mc:AlternateContent xmlns:mc="http://schemas.openxmlformats.org/markup-compatibility/2006" xmlns:a14="http://schemas.microsoft.com/office/drawing/2010/main">
+        <mc:Choice Requires="a14">
           <p:sp>
             <p:nvSpPr>
               <p:cNvPr id="3" name="Content Placeholder 2">
@@ -10514,7 +10514,7 @@
             </p:txBody>
           </p:sp>
         </mc:Choice>
-        <mc:Fallback>
+        <mc:Fallback xmlns="">
           <p:sp>
             <p:nvSpPr>
               <p:cNvPr id="3" name="Content Placeholder 2">
@@ -12415,7 +12415,7 @@
               </a:r>
               <a:r>
                 <a:rPr lang="en-US" dirty="0"/>
-                <a:t> = [0,1,2,3,4]</a:t>
+                <a:t> = [1,2,3,4]</a:t>
               </a:r>
             </a:p>
           </p:txBody>
@@ -19478,8 +19478,8 @@
           </a:p>
         </p:txBody>
       </p:sp>
-      <mc:AlternateContent xmlns:mc="http://schemas.openxmlformats.org/markup-compatibility/2006">
-        <mc:Choice xmlns:a14="http://schemas.microsoft.com/office/drawing/2010/main" Requires="a14">
+      <mc:AlternateContent xmlns:mc="http://schemas.openxmlformats.org/markup-compatibility/2006" xmlns:a14="http://schemas.microsoft.com/office/drawing/2010/main">
+        <mc:Choice Requires="a14">
           <p:sp>
             <p:nvSpPr>
               <p:cNvPr id="3" name="Content Placeholder 2">
@@ -19516,66 +19516,87 @@
                 </a:r>
               </a:p>
               <a:p>
-                <a:pPr/>
                 <a14:m>
                   <m:oMath xmlns:m="http://schemas.openxmlformats.org/officeDocument/2006/math">
                     <m:r>
-                      <a:rPr lang="en-US" sz="2200" b="0" i="1" smtClean="0"/>
+                      <a:rPr lang="en-US" sz="2200" b="0" i="1" smtClean="0">
+                        <a:latin typeface="Cambria Math" panose="02040503050406030204" pitchFamily="18" charset="0"/>
+                      </a:rPr>
                       <m:t>𝑙𝑏</m:t>
                     </m:r>
                     <m:d>
                       <m:dPr>
                         <m:ctrlPr>
-                          <a:rPr lang="en-US" sz="2200" b="0" i="1" smtClean="0"/>
+                          <a:rPr lang="en-US" sz="2200" b="0" i="1" smtClean="0">
+                            <a:latin typeface="Cambria Math" panose="02040503050406030204" pitchFamily="18" charset="0"/>
+                          </a:rPr>
                         </m:ctrlPr>
                       </m:dPr>
                       <m:e>
                         <m:r>
-                          <a:rPr lang="en-US" sz="2200" b="0" i="1" smtClean="0"/>
+                          <a:rPr lang="en-US" sz="2200" b="0" i="1" smtClean="0">
+                            <a:latin typeface="Cambria Math" panose="02040503050406030204" pitchFamily="18" charset="0"/>
+                          </a:rPr>
                           <m:t>𝑑𝑎𝑡𝑎𝑡𝑦𝑝𝑒</m:t>
                         </m:r>
                       </m:e>
                     </m:d>
                     <m:r>
-                      <a:rPr lang="en-US" sz="2200" b="0" i="1" smtClean="0"/>
+                      <a:rPr lang="en-US" sz="2200" b="0" i="1" smtClean="0">
+                        <a:latin typeface="Cambria Math" panose="02040503050406030204" pitchFamily="18" charset="0"/>
+                      </a:rPr>
                       <m:t>=</m:t>
                     </m:r>
                     <m:r>
                       <m:rPr>
                         <m:sty m:val="p"/>
                       </m:rPr>
-                      <a:rPr lang="en-US" sz="2200" b="0" i="0" smtClean="0"/>
+                      <a:rPr lang="en-US" sz="2200" b="0" i="0" smtClean="0">
+                        <a:latin typeface="Cambria Math" panose="02040503050406030204" pitchFamily="18" charset="0"/>
+                      </a:rPr>
                       <m:t>min</m:t>
                     </m:r>
                     <m:r>
-                      <a:rPr lang="en-US" sz="2200" b="0" i="1" smtClean="0"/>
+                      <a:rPr lang="en-US" sz="2200" b="0" i="1" smtClean="0">
+                        <a:latin typeface="Cambria Math" panose="02040503050406030204" pitchFamily="18" charset="0"/>
+                      </a:rPr>
                       <m:t>⁡(</m:t>
                     </m:r>
                     <m:r>
-                      <a:rPr lang="en-US" sz="2200" b="0" i="1" smtClean="0"/>
+                      <a:rPr lang="en-US" sz="2200" b="0" i="1" smtClean="0">
+                        <a:latin typeface="Cambria Math" panose="02040503050406030204" pitchFamily="18" charset="0"/>
+                      </a:rPr>
                       <m:t>𝑑𝑖𝑠</m:t>
                     </m:r>
                     <m:sSub>
                       <m:sSubPr>
                         <m:ctrlPr>
-                          <a:rPr lang="en-US" sz="2200" b="0" i="1" smtClean="0"/>
+                          <a:rPr lang="en-US" sz="2200" b="0" i="1" smtClean="0">
+                            <a:latin typeface="Cambria Math" panose="02040503050406030204" pitchFamily="18" charset="0"/>
+                          </a:rPr>
                         </m:ctrlPr>
                       </m:sSubPr>
                       <m:e>
                         <m:r>
-                          <a:rPr lang="en-US" sz="2200" b="0" i="1" smtClean="0"/>
+                          <a:rPr lang="en-US" sz="2200" b="0" i="1" smtClean="0">
+                            <a:latin typeface="Cambria Math" panose="02040503050406030204" pitchFamily="18" charset="0"/>
+                          </a:rPr>
                           <m:t>𝑝</m:t>
                         </m:r>
                       </m:e>
                       <m:sub>
                         <m:r>
-                          <a:rPr lang="en-US" sz="2200" b="0" i="1" smtClean="0"/>
+                          <a:rPr lang="en-US" sz="2200" b="0" i="1" smtClean="0">
+                            <a:latin typeface="Cambria Math" panose="02040503050406030204" pitchFamily="18" charset="0"/>
+                          </a:rPr>
                           <m:t>𝑖</m:t>
                         </m:r>
                       </m:sub>
                     </m:sSub>
                     <m:r>
-                      <a:rPr lang="en-US" sz="2200" b="0" i="1" smtClean="0"/>
+                      <a:rPr lang="en-US" sz="2200" b="0" i="1" smtClean="0">
+                        <a:latin typeface="Cambria Math" panose="02040503050406030204" pitchFamily="18" charset="0"/>
+                      </a:rPr>
                       <m:t>)</m:t>
                     </m:r>
                   </m:oMath>
@@ -19583,101 +19604,134 @@
                 <a:endParaRPr lang="en-US" sz="2200" dirty="0"/>
               </a:p>
               <a:p>
-                <a:pPr/>
                 <a14:m>
                   <m:oMath xmlns:m="http://schemas.openxmlformats.org/officeDocument/2006/math">
                     <m:r>
-                      <a:rPr lang="en-US" sz="2200" b="0" i="1" smtClean="0"/>
+                      <a:rPr lang="en-US" sz="2200" b="0" i="1" smtClean="0">
+                        <a:latin typeface="Cambria Math" panose="02040503050406030204" pitchFamily="18" charset="0"/>
+                      </a:rPr>
                       <m:t>𝑢𝑏</m:t>
                     </m:r>
                     <m:d>
                       <m:dPr>
                         <m:ctrlPr>
-                          <a:rPr lang="en-US" sz="2200" b="0" i="1" smtClean="0"/>
+                          <a:rPr lang="en-US" sz="2200" b="0" i="1" smtClean="0">
+                            <a:latin typeface="Cambria Math" panose="02040503050406030204" pitchFamily="18" charset="0"/>
+                          </a:rPr>
                         </m:ctrlPr>
                       </m:dPr>
                       <m:e>
                         <m:r>
-                          <a:rPr lang="en-US" sz="2200" b="0" i="1" smtClean="0"/>
+                          <a:rPr lang="en-US" sz="2200" b="0" i="1" smtClean="0">
+                            <a:latin typeface="Cambria Math" panose="02040503050406030204" pitchFamily="18" charset="0"/>
+                          </a:rPr>
                           <m:t>𝑑𝑎𝑡𝑎𝑡𝑦𝑝𝑒</m:t>
                         </m:r>
                       </m:e>
                     </m:d>
                     <m:r>
-                      <a:rPr lang="en-US" sz="2200" b="0" i="1" smtClean="0"/>
+                      <a:rPr lang="en-US" sz="2200" b="0" i="1" smtClean="0">
+                        <a:latin typeface="Cambria Math" panose="02040503050406030204" pitchFamily="18" charset="0"/>
+                      </a:rPr>
                       <m:t>=</m:t>
                     </m:r>
                     <m:r>
                       <m:rPr>
                         <m:sty m:val="p"/>
                       </m:rPr>
-                      <a:rPr lang="en-US" sz="2200" b="0" i="0" smtClean="0"/>
+                      <a:rPr lang="en-US" sz="2200" b="0" i="0" smtClean="0">
+                        <a:latin typeface="Cambria Math" panose="02040503050406030204" pitchFamily="18" charset="0"/>
+                      </a:rPr>
                       <m:t>max</m:t>
                     </m:r>
                     <m:d>
                       <m:dPr>
                         <m:ctrlPr>
-                          <a:rPr lang="en-US" sz="2200" b="0" i="1" smtClean="0"/>
+                          <a:rPr lang="en-US" sz="2200" b="0" i="1" smtClean="0">
+                            <a:latin typeface="Cambria Math" panose="02040503050406030204" pitchFamily="18" charset="0"/>
+                          </a:rPr>
                         </m:ctrlPr>
                       </m:dPr>
                       <m:e>
                         <m:r>
-                          <a:rPr lang="en-US" sz="2200" b="0" i="1" smtClean="0"/>
+                          <a:rPr lang="en-US" sz="2200" b="0" i="1" smtClean="0">
+                            <a:latin typeface="Cambria Math" panose="02040503050406030204" pitchFamily="18" charset="0"/>
+                          </a:rPr>
                           <m:t>𝑑𝑖𝑠</m:t>
                         </m:r>
                         <m:sSub>
                           <m:sSubPr>
                             <m:ctrlPr>
-                              <a:rPr lang="en-US" sz="2200" b="0" i="1" smtClean="0"/>
+                              <a:rPr lang="en-US" sz="2200" b="0" i="1" smtClean="0">
+                                <a:latin typeface="Cambria Math" panose="02040503050406030204" pitchFamily="18" charset="0"/>
+                              </a:rPr>
                             </m:ctrlPr>
                           </m:sSubPr>
                           <m:e>
                             <m:r>
-                              <a:rPr lang="en-US" sz="2200" b="0" i="1" smtClean="0"/>
+                              <a:rPr lang="en-US" sz="2200" b="0" i="1" smtClean="0">
+                                <a:latin typeface="Cambria Math" panose="02040503050406030204" pitchFamily="18" charset="0"/>
+                              </a:rPr>
                               <m:t>𝑝</m:t>
                             </m:r>
                           </m:e>
                           <m:sub>
                             <m:r>
-                              <a:rPr lang="en-US" sz="2200" b="0" i="1" smtClean="0"/>
+                              <a:rPr lang="en-US" sz="2200" b="0" i="1" smtClean="0">
+                                <a:latin typeface="Cambria Math" panose="02040503050406030204" pitchFamily="18" charset="0"/>
+                              </a:rPr>
                               <m:t>𝑖</m:t>
                             </m:r>
                           </m:sub>
                         </m:sSub>
                         <m:r>
-                          <a:rPr lang="en-US" sz="2200" b="0" i="1" smtClean="0"/>
+                          <a:rPr lang="en-US" sz="2200" b="0" i="1" smtClean="0">
+                            <a:latin typeface="Cambria Math" panose="02040503050406030204" pitchFamily="18" charset="0"/>
+                          </a:rPr>
                           <m:t>+</m:t>
                         </m:r>
                         <m:r>
-                          <a:rPr lang="en-US" sz="2200" b="0" i="1" smtClean="0"/>
+                          <a:rPr lang="en-US" sz="2200" b="0" i="1" smtClean="0">
+                            <a:latin typeface="Cambria Math" panose="02040503050406030204" pitchFamily="18" charset="0"/>
+                          </a:rPr>
                           <m:t>𝑠𝑖𝑧𝑒𝑜𝑓</m:t>
                         </m:r>
                         <m:d>
                           <m:dPr>
                             <m:ctrlPr>
-                              <a:rPr lang="en-US" sz="2200" b="0" i="1" smtClean="0"/>
+                              <a:rPr lang="en-US" sz="2200" b="0" i="1" smtClean="0">
+                                <a:latin typeface="Cambria Math" panose="02040503050406030204" pitchFamily="18" charset="0"/>
+                              </a:rPr>
                             </m:ctrlPr>
                           </m:dPr>
                           <m:e>
                             <m:r>
-                              <a:rPr lang="en-US" sz="2200" b="0" i="1" smtClean="0"/>
+                              <a:rPr lang="en-US" sz="2200" b="0" i="1" smtClean="0">
+                                <a:latin typeface="Cambria Math" panose="02040503050406030204" pitchFamily="18" charset="0"/>
+                              </a:rPr>
                               <m:t>𝑡𝑦𝑝</m:t>
                             </m:r>
                             <m:sSub>
                               <m:sSubPr>
                                 <m:ctrlPr>
-                                  <a:rPr lang="en-US" sz="2200" b="0" i="1" smtClean="0"/>
+                                  <a:rPr lang="en-US" sz="2200" b="0" i="1" smtClean="0">
+                                    <a:latin typeface="Cambria Math" panose="02040503050406030204" pitchFamily="18" charset="0"/>
+                                  </a:rPr>
                                 </m:ctrlPr>
                               </m:sSubPr>
                               <m:e>
                                 <m:r>
-                                  <a:rPr lang="en-US" sz="2200" b="0" i="1" smtClean="0"/>
+                                  <a:rPr lang="en-US" sz="2200" b="0" i="1" smtClean="0">
+                                    <a:latin typeface="Cambria Math" panose="02040503050406030204" pitchFamily="18" charset="0"/>
+                                  </a:rPr>
                                   <m:t>𝑒</m:t>
                                 </m:r>
                               </m:e>
                               <m:sub>
                                 <m:r>
-                                  <a:rPr lang="en-US" sz="2200" b="0" i="1" smtClean="0"/>
+                                  <a:rPr lang="en-US" sz="2200" b="0" i="1" smtClean="0">
+                                    <a:latin typeface="Cambria Math" panose="02040503050406030204" pitchFamily="18" charset="0"/>
+                                  </a:rPr>
                                   <m:t>𝑖</m:t>
                                 </m:r>
                               </m:sub>
@@ -19687,11 +19741,15 @@
                       </m:e>
                     </m:d>
                     <m:r>
-                      <a:rPr lang="en-US" sz="2200" b="0" i="1" smtClean="0"/>
+                      <a:rPr lang="en-US" sz="2200" b="0" i="1" smtClean="0">
+                        <a:latin typeface="Cambria Math" panose="02040503050406030204" pitchFamily="18" charset="0"/>
+                      </a:rPr>
                       <m:t>+</m:t>
                     </m:r>
                     <m:r>
-                      <a:rPr lang="en-US" sz="2200" b="0" i="1" smtClean="0"/>
+                      <a:rPr lang="en-US" sz="2200" b="0" i="1" smtClean="0">
+                        <a:latin typeface="Cambria Math" panose="02040503050406030204" pitchFamily="18" charset="0"/>
+                      </a:rPr>
                       <m:t>𝑝𝑎𝑑𝑑𝑖𝑛𝑔</m:t>
                     </m:r>
                   </m:oMath>
@@ -19722,65 +19780,88 @@
                 </a:r>
               </a:p>
               <a:p>
-                <a:pPr/>
                 <a14:m>
                   <m:oMath xmlns:m="http://schemas.openxmlformats.org/officeDocument/2006/math">
                     <m:r>
-                      <a:rPr lang="en-US" sz="2200" b="0" i="1" smtClean="0"/>
+                      <a:rPr lang="en-US" sz="2200" b="0" i="1" smtClean="0">
+                        <a:latin typeface="Cambria Math" panose="02040503050406030204" pitchFamily="18" charset="0"/>
+                      </a:rPr>
                       <m:t>𝑒𝑥𝑡𝑒𝑛𝑡</m:t>
                     </m:r>
                     <m:d>
                       <m:dPr>
                         <m:ctrlPr>
-                          <a:rPr lang="en-US" sz="2200" b="0" i="1" smtClean="0"/>
+                          <a:rPr lang="en-US" sz="2200" b="0" i="1" smtClean="0">
+                            <a:latin typeface="Cambria Math" panose="02040503050406030204" pitchFamily="18" charset="0"/>
+                          </a:rPr>
                         </m:ctrlPr>
                       </m:dPr>
                       <m:e>
                         <m:r>
-                          <a:rPr lang="en-US" sz="2200" b="0" i="1" smtClean="0"/>
+                          <a:rPr lang="en-US" sz="2200" b="0" i="1" smtClean="0">
+                            <a:latin typeface="Cambria Math" panose="02040503050406030204" pitchFamily="18" charset="0"/>
+                          </a:rPr>
                           <m:t>𝑑𝑎𝑡𝑎𝑡𝑦𝑝𝑒</m:t>
                         </m:r>
                       </m:e>
                     </m:d>
                     <m:r>
-                      <a:rPr lang="en-US" sz="2200" b="0" i="1" smtClean="0"/>
+                      <a:rPr lang="en-US" sz="2200" b="0" i="1" smtClean="0">
+                        <a:latin typeface="Cambria Math" panose="02040503050406030204" pitchFamily="18" charset="0"/>
+                      </a:rPr>
                       <m:t>=</m:t>
                     </m:r>
                     <m:r>
-                      <a:rPr lang="en-US" sz="2200" b="0" i="1" smtClean="0"/>
+                      <a:rPr lang="en-US" sz="2200" b="0" i="1" smtClean="0">
+                        <a:latin typeface="Cambria Math" panose="02040503050406030204" pitchFamily="18" charset="0"/>
+                      </a:rPr>
                       <m:t>𝑢𝑏</m:t>
                     </m:r>
                     <m:d>
                       <m:dPr>
                         <m:ctrlPr>
-                          <a:rPr lang="en-US" sz="2200" b="0" i="1" smtClean="0"/>
+                          <a:rPr lang="en-US" sz="2200" b="0" i="1" smtClean="0">
+                            <a:latin typeface="Cambria Math" panose="02040503050406030204" pitchFamily="18" charset="0"/>
+                          </a:rPr>
                         </m:ctrlPr>
                       </m:dPr>
                       <m:e>
                         <m:r>
-                          <a:rPr lang="en-US" sz="2200" b="0" i="1" smtClean="0"/>
+                          <a:rPr lang="en-US" sz="2200" b="0" i="1" smtClean="0">
+                            <a:latin typeface="Cambria Math" panose="02040503050406030204" pitchFamily="18" charset="0"/>
+                          </a:rPr>
                           <m:t>𝑑𝑎𝑡𝑎𝑡𝑦𝑝𝑒</m:t>
                         </m:r>
                       </m:e>
                     </m:d>
                     <m:r>
-                      <a:rPr lang="en-US" sz="2200" b="0" i="1" smtClean="0"/>
+                      <a:rPr lang="en-US" sz="2200" b="0" i="1" smtClean="0">
+                        <a:latin typeface="Cambria Math" panose="02040503050406030204" pitchFamily="18" charset="0"/>
+                      </a:rPr>
                       <m:t>−</m:t>
                     </m:r>
                     <m:r>
-                      <a:rPr lang="en-US" sz="2200" b="0" i="1" smtClean="0"/>
+                      <a:rPr lang="en-US" sz="2200" b="0" i="1" smtClean="0">
+                        <a:latin typeface="Cambria Math" panose="02040503050406030204" pitchFamily="18" charset="0"/>
+                      </a:rPr>
                       <m:t>𝑙𝑏</m:t>
                     </m:r>
                     <m:r>
-                      <a:rPr lang="en-US" sz="2200" b="0" i="1" smtClean="0"/>
+                      <a:rPr lang="en-US" sz="2200" b="0" i="1" smtClean="0">
+                        <a:latin typeface="Cambria Math" panose="02040503050406030204" pitchFamily="18" charset="0"/>
+                      </a:rPr>
                       <m:t>(</m:t>
                     </m:r>
                     <m:r>
-                      <a:rPr lang="en-US" sz="2200" b="0" i="1" smtClean="0"/>
+                      <a:rPr lang="en-US" sz="2200" b="0" i="1" smtClean="0">
+                        <a:latin typeface="Cambria Math" panose="02040503050406030204" pitchFamily="18" charset="0"/>
+                      </a:rPr>
                       <m:t>𝑑𝑎𝑡𝑎𝑡𝑦𝑝𝑒</m:t>
                     </m:r>
                     <m:r>
-                      <a:rPr lang="en-US" sz="2200" b="0" i="1" smtClean="0"/>
+                      <a:rPr lang="en-US" sz="2200" b="0" i="1" smtClean="0">
+                        <a:latin typeface="Cambria Math" panose="02040503050406030204" pitchFamily="18" charset="0"/>
+                      </a:rPr>
                       <m:t>)</m:t>
                     </m:r>
                   </m:oMath>
@@ -19788,7 +19869,6 @@
                 <a:endParaRPr lang="en-US" sz="2200" i="1" dirty="0"/>
               </a:p>
               <a:p>
-                <a:pPr/>
                 <a:r>
                   <a:rPr lang="en-US" sz="2200" dirty="0"/>
                   <a:t>The extent of a datatype is the step size in bytes when accessing consecutive elements of that datatype </a:t>
@@ -19814,28 +19894,35 @@
                 </a:r>
               </a:p>
               <a:p>
-                <a:pPr/>
                 <a14:m>
                   <m:oMath xmlns:m="http://schemas.openxmlformats.org/officeDocument/2006/math">
                     <m:r>
-                      <a:rPr lang="en-US" sz="2200" b="0" i="1" smtClean="0"/>
+                      <a:rPr lang="en-US" sz="2200" b="0" i="1" smtClean="0">
+                        <a:latin typeface="Cambria Math" panose="02040503050406030204" pitchFamily="18" charset="0"/>
+                      </a:rPr>
                       <m:t>𝑠𝑖𝑧𝑒</m:t>
                     </m:r>
                     <m:d>
                       <m:dPr>
                         <m:ctrlPr>
-                          <a:rPr lang="en-US" sz="2200" b="0" i="1" smtClean="0"/>
+                          <a:rPr lang="en-US" sz="2200" b="0" i="1" smtClean="0">
+                            <a:latin typeface="Cambria Math" panose="02040503050406030204" pitchFamily="18" charset="0"/>
+                          </a:rPr>
                         </m:ctrlPr>
                       </m:dPr>
                       <m:e>
                         <m:r>
-                          <a:rPr lang="en-US" sz="2200" b="0" i="1" smtClean="0"/>
+                          <a:rPr lang="en-US" sz="2200" b="0" i="1" smtClean="0">
+                            <a:latin typeface="Cambria Math" panose="02040503050406030204" pitchFamily="18" charset="0"/>
+                          </a:rPr>
                           <m:t>𝑑𝑎𝑡𝑎𝑡𝑦𝑝𝑒</m:t>
                         </m:r>
                       </m:e>
                     </m:d>
                     <m:r>
-                      <a:rPr lang="en-US" sz="2200" b="0" i="1" smtClean="0"/>
+                      <a:rPr lang="en-US" sz="2200" b="0" i="1" smtClean="0">
+                        <a:latin typeface="Cambria Math" panose="02040503050406030204" pitchFamily="18" charset="0"/>
+                      </a:rPr>
                       <m:t>=</m:t>
                     </m:r>
                     <m:nary>
@@ -19844,7 +19931,9 @@
                         <m:limLoc m:val="subSup"/>
                         <m:supHide m:val="on"/>
                         <m:ctrlPr>
-                          <a:rPr lang="en-US" sz="2200" b="0" i="1" smtClean="0"/>
+                          <a:rPr lang="en-US" sz="2200" b="0" i="1" smtClean="0">
+                            <a:latin typeface="Cambria Math" panose="02040503050406030204" pitchFamily="18" charset="0"/>
+                          </a:rPr>
                         </m:ctrlPr>
                       </m:naryPr>
                       <m:sub>
@@ -19852,39 +19941,53 @@
                           <m:rPr>
                             <m:brk m:alnAt="9"/>
                           </m:rPr>
-                          <a:rPr lang="en-US" sz="2200" b="0" i="1" smtClean="0"/>
+                          <a:rPr lang="en-US" sz="2200" b="0" i="1" smtClean="0">
+                            <a:latin typeface="Cambria Math" panose="02040503050406030204" pitchFamily="18" charset="0"/>
+                          </a:rPr>
                           <m:t>𝑖</m:t>
                         </m:r>
                       </m:sub>
                       <m:sup/>
                       <m:e>
                         <m:r>
-                          <a:rPr lang="en-US" sz="2200" b="0" i="1" smtClean="0"/>
+                          <a:rPr lang="en-US" sz="2200" b="0" i="1" smtClean="0">
+                            <a:latin typeface="Cambria Math" panose="02040503050406030204" pitchFamily="18" charset="0"/>
+                          </a:rPr>
                           <m:t>𝑠𝑖𝑧𝑒𝑜𝑓</m:t>
                         </m:r>
                         <m:r>
-                          <a:rPr lang="en-US" sz="2200" b="0" i="1" smtClean="0"/>
+                          <a:rPr lang="en-US" sz="2200" b="0" i="1" smtClean="0">
+                            <a:latin typeface="Cambria Math" panose="02040503050406030204" pitchFamily="18" charset="0"/>
+                          </a:rPr>
                           <m:t>(</m:t>
                         </m:r>
                         <m:r>
-                          <a:rPr lang="en-US" sz="2200" b="0" i="1" smtClean="0"/>
+                          <a:rPr lang="en-US" sz="2200" b="0" i="1" smtClean="0">
+                            <a:latin typeface="Cambria Math" panose="02040503050406030204" pitchFamily="18" charset="0"/>
+                          </a:rPr>
                           <m:t>𝑡𝑦𝑝</m:t>
                         </m:r>
                         <m:sSub>
                           <m:sSubPr>
                             <m:ctrlPr>
-                              <a:rPr lang="en-US" sz="2200" b="0" i="1" smtClean="0"/>
+                              <a:rPr lang="en-US" sz="2200" b="0" i="1" smtClean="0">
+                                <a:latin typeface="Cambria Math" panose="02040503050406030204" pitchFamily="18" charset="0"/>
+                              </a:rPr>
                             </m:ctrlPr>
                           </m:sSubPr>
                           <m:e>
                             <m:r>
-                              <a:rPr lang="en-US" sz="2200" b="0" i="1" smtClean="0"/>
+                              <a:rPr lang="en-US" sz="2200" b="0" i="1" smtClean="0">
+                                <a:latin typeface="Cambria Math" panose="02040503050406030204" pitchFamily="18" charset="0"/>
+                              </a:rPr>
                               <m:t>𝑒</m:t>
                             </m:r>
                           </m:e>
                           <m:sub>
                             <m:r>
-                              <a:rPr lang="en-US" sz="2200" b="0" i="1" smtClean="0"/>
+                              <a:rPr lang="en-US" sz="2200" b="0" i="1" smtClean="0">
+                                <a:latin typeface="Cambria Math" panose="02040503050406030204" pitchFamily="18" charset="0"/>
+                              </a:rPr>
                               <m:t>𝑖</m:t>
                             </m:r>
                           </m:sub>
@@ -19892,7 +19995,9 @@
                       </m:e>
                     </m:nary>
                     <m:r>
-                      <a:rPr lang="en-US" sz="2200" b="0" i="1" smtClean="0"/>
+                      <a:rPr lang="en-US" sz="2200" b="0" i="1" smtClean="0">
+                        <a:latin typeface="Cambria Math" panose="02040503050406030204" pitchFamily="18" charset="0"/>
+                      </a:rPr>
                       <m:t>))</m:t>
                     </m:r>
                   </m:oMath>
@@ -19900,7 +20005,6 @@
                 <a:endParaRPr lang="en-US" sz="2200" dirty="0"/>
               </a:p>
               <a:p>
-                <a:pPr/>
                 <a:r>
                   <a:rPr lang="en-US" sz="2200" dirty="0"/>
                   <a:t>The size of a datatype is the amount in bytes taken by the datatype, </a:t>
@@ -19971,7 +20075,7 @@
             </p:txBody>
           </p:sp>
         </mc:Choice>
-        <mc:Fallback>
+        <mc:Fallback xmlns="">
           <p:sp>
             <p:nvSpPr>
               <p:cNvPr id="3" name="Content Placeholder 2">
@@ -20073,8 +20177,8 @@
           </a:p>
         </p:txBody>
       </p:sp>
-      <mc:AlternateContent xmlns:mc="http://schemas.openxmlformats.org/markup-compatibility/2006">
-        <mc:Choice xmlns:a14="http://schemas.microsoft.com/office/drawing/2010/main" Requires="a14">
+      <mc:AlternateContent xmlns:mc="http://schemas.openxmlformats.org/markup-compatibility/2006" xmlns:a14="http://schemas.microsoft.com/office/drawing/2010/main">
+        <mc:Choice Requires="a14">
           <p:sp>
             <p:nvSpPr>
               <p:cNvPr id="3" name="Content Placeholder 2">
@@ -20440,7 +20544,7 @@
             </p:txBody>
           </p:sp>
         </mc:Choice>
-        <mc:Fallback>
+        <mc:Fallback xmlns="">
           <p:sp>
             <p:nvSpPr>
               <p:cNvPr id="3" name="Content Placeholder 2">

</xml_diff>